<commit_message>
I added our final ppt
</commit_message>
<xml_diff>
--- a/Music and Mental Health - Consolidated.pptx
+++ b/Music and Mental Health - Consolidated.pptx
@@ -124,6 +124,35 @@
     </p:ext>
   </p:extLst>
 </p:presentation>
+</file>
+
+<file path=ppt/changesInfos/changesInfo1.xml><?xml version="1.0" encoding="utf-8"?>
+<pc:chgInfo xmlns:a="http://schemas.openxmlformats.org/drawingml/2006/main" xmlns:r="http://schemas.openxmlformats.org/officeDocument/2006/relationships" xmlns:ac="http://schemas.microsoft.com/office/drawing/2013/main/command" xmlns:pc="http://schemas.microsoft.com/office/powerpoint/2013/main/command">
+  <pc:docChgLst>
+    <pc:chgData name="Sweta Virani" userId="06e3792e9a70d39d" providerId="LiveId" clId="{4246B6F0-D92C-4C6E-AD56-B7559F0A4F23}"/>
+    <pc:docChg chg="modSld">
+      <pc:chgData name="Sweta Virani" userId="06e3792e9a70d39d" providerId="LiveId" clId="{4246B6F0-D92C-4C6E-AD56-B7559F0A4F23}" dt="2023-02-16T00:07:19.861" v="4" actId="20577"/>
+      <pc:docMkLst>
+        <pc:docMk/>
+      </pc:docMkLst>
+      <pc:sldChg chg="modSp mod">
+        <pc:chgData name="Sweta Virani" userId="06e3792e9a70d39d" providerId="LiveId" clId="{4246B6F0-D92C-4C6E-AD56-B7559F0A4F23}" dt="2023-02-16T00:07:19.861" v="4" actId="20577"/>
+        <pc:sldMkLst>
+          <pc:docMk/>
+          <pc:sldMk cId="3165924428" sldId="273"/>
+        </pc:sldMkLst>
+        <pc:spChg chg="mod">
+          <ac:chgData name="Sweta Virani" userId="06e3792e9a70d39d" providerId="LiveId" clId="{4246B6F0-D92C-4C6E-AD56-B7559F0A4F23}" dt="2023-02-16T00:07:19.861" v="4" actId="20577"/>
+          <ac:spMkLst>
+            <pc:docMk/>
+            <pc:sldMk cId="3165924428" sldId="273"/>
+            <ac:spMk id="4" creationId="{5D0DF4AE-AA83-9672-1898-EB089E68ECD1}"/>
+          </ac:spMkLst>
+        </pc:spChg>
+      </pc:sldChg>
+    </pc:docChg>
+  </pc:docChgLst>
+</pc:chgInfo>
 </file>
 
 <file path=ppt/slideLayouts/slideLayout1.xml><?xml version="1.0" encoding="utf-8"?>
@@ -15254,7 +15283,7 @@
                 <a:ea typeface="Calibri" panose="020F0502020204030204" pitchFamily="34" charset="0"/>
                 <a:cs typeface="Calibri" panose="020F0502020204030204" pitchFamily="34" charset="0"/>
               </a:rPr>
-              <a:t>Favorite Genre by Combined Mental health rankings group</a:t>
+              <a:t>Favorite Genre by Combined Mental health scale</a:t>
             </a:r>
             <a:endParaRPr lang="en-US" dirty="0">
               <a:latin typeface="Tahoma" panose="020B0604030504040204" pitchFamily="34" charset="0"/>

</xml_diff>